<commit_message>
C# Training Slides Update
</commit_message>
<xml_diff>
--- a/Slides/02_C#_TrainingPlan.pptx
+++ b/Slides/02_C#_TrainingPlan.pptx
@@ -243,7 +243,7 @@
           <a:p>
             <a:fld id="{F2CCBB93-BAE9-4D98-B8FE-98BE5BFF2E59}" type="datetimeFigureOut">
               <a:rPr lang="en-US" smtClean="0"/>
-              <a:t>1/28/2018</a:t>
+              <a:t>2/4/2018</a:t>
             </a:fld>
             <a:endParaRPr lang="en-US"/>
           </a:p>
@@ -6853,7 +6853,7 @@
           <a:p>
             <a:fld id="{96FB5D56-0812-4ED5-8B52-3D0DCBF578CB}" type="datetimeFigureOut">
               <a:rPr lang="en-US" smtClean="0"/>
-              <a:t>1/28/2018</a:t>
+              <a:t>2/4/2018</a:t>
             </a:fld>
             <a:endParaRPr lang="en-US"/>
           </a:p>
@@ -7128,7 +7128,7 @@
           <a:p>
             <a:fld id="{96FB5D56-0812-4ED5-8B52-3D0DCBF578CB}" type="datetimeFigureOut">
               <a:rPr lang="en-US" smtClean="0"/>
-              <a:t>1/28/2018</a:t>
+              <a:t>2/4/2018</a:t>
             </a:fld>
             <a:endParaRPr lang="en-US"/>
           </a:p>
@@ -7322,7 +7322,7 @@
           <a:p>
             <a:fld id="{96FB5D56-0812-4ED5-8B52-3D0DCBF578CB}" type="datetimeFigureOut">
               <a:rPr lang="en-US" smtClean="0"/>
-              <a:t>1/28/2018</a:t>
+              <a:t>2/4/2018</a:t>
             </a:fld>
             <a:endParaRPr lang="en-US"/>
           </a:p>
@@ -7595,7 +7595,7 @@
           <a:p>
             <a:fld id="{96FB5D56-0812-4ED5-8B52-3D0DCBF578CB}" type="datetimeFigureOut">
               <a:rPr lang="en-US" smtClean="0"/>
-              <a:t>1/28/2018</a:t>
+              <a:t>2/4/2018</a:t>
             </a:fld>
             <a:endParaRPr lang="en-US"/>
           </a:p>
@@ -7936,7 +7936,7 @@
           <a:p>
             <a:fld id="{96FB5D56-0812-4ED5-8B52-3D0DCBF578CB}" type="datetimeFigureOut">
               <a:rPr lang="en-US" smtClean="0"/>
-              <a:t>1/28/2018</a:t>
+              <a:t>2/4/2018</a:t>
             </a:fld>
             <a:endParaRPr lang="en-US"/>
           </a:p>
@@ -8559,7 +8559,7 @@
           <a:p>
             <a:fld id="{96FB5D56-0812-4ED5-8B52-3D0DCBF578CB}" type="datetimeFigureOut">
               <a:rPr lang="en-US" smtClean="0"/>
-              <a:t>1/28/2018</a:t>
+              <a:t>2/4/2018</a:t>
             </a:fld>
             <a:endParaRPr lang="en-US"/>
           </a:p>
@@ -9419,7 +9419,7 @@
           <a:p>
             <a:fld id="{96FB5D56-0812-4ED5-8B52-3D0DCBF578CB}" type="datetimeFigureOut">
               <a:rPr lang="en-US" smtClean="0"/>
-              <a:t>1/28/2018</a:t>
+              <a:t>2/4/2018</a:t>
             </a:fld>
             <a:endParaRPr lang="en-US"/>
           </a:p>
@@ -9589,7 +9589,7 @@
           <a:p>
             <a:fld id="{96FB5D56-0812-4ED5-8B52-3D0DCBF578CB}" type="datetimeFigureOut">
               <a:rPr lang="en-US" smtClean="0"/>
-              <a:t>1/28/2018</a:t>
+              <a:t>2/4/2018</a:t>
             </a:fld>
             <a:endParaRPr lang="en-US"/>
           </a:p>
@@ -9769,7 +9769,7 @@
           <a:p>
             <a:fld id="{96FB5D56-0812-4ED5-8B52-3D0DCBF578CB}" type="datetimeFigureOut">
               <a:rPr lang="en-US" smtClean="0"/>
-              <a:t>1/28/2018</a:t>
+              <a:t>2/4/2018</a:t>
             </a:fld>
             <a:endParaRPr lang="en-US"/>
           </a:p>
@@ -9939,7 +9939,7 @@
           <a:p>
             <a:fld id="{96FB5D56-0812-4ED5-8B52-3D0DCBF578CB}" type="datetimeFigureOut">
               <a:rPr lang="en-US" smtClean="0"/>
-              <a:t>1/28/2018</a:t>
+              <a:t>2/4/2018</a:t>
             </a:fld>
             <a:endParaRPr lang="en-US"/>
           </a:p>
@@ -10186,7 +10186,7 @@
           <a:p>
             <a:fld id="{96FB5D56-0812-4ED5-8B52-3D0DCBF578CB}" type="datetimeFigureOut">
               <a:rPr lang="en-US" smtClean="0"/>
-              <a:t>1/28/2018</a:t>
+              <a:t>2/4/2018</a:t>
             </a:fld>
             <a:endParaRPr lang="en-US"/>
           </a:p>
@@ -10478,7 +10478,7 @@
           <a:p>
             <a:fld id="{96FB5D56-0812-4ED5-8B52-3D0DCBF578CB}" type="datetimeFigureOut">
               <a:rPr lang="en-US" smtClean="0"/>
-              <a:t>1/28/2018</a:t>
+              <a:t>2/4/2018</a:t>
             </a:fld>
             <a:endParaRPr lang="en-US"/>
           </a:p>
@@ -10922,7 +10922,7 @@
           <a:p>
             <a:fld id="{96FB5D56-0812-4ED5-8B52-3D0DCBF578CB}" type="datetimeFigureOut">
               <a:rPr lang="en-US" smtClean="0"/>
-              <a:t>1/28/2018</a:t>
+              <a:t>2/4/2018</a:t>
             </a:fld>
             <a:endParaRPr lang="en-US"/>
           </a:p>
@@ -11040,7 +11040,7 @@
           <a:p>
             <a:fld id="{96FB5D56-0812-4ED5-8B52-3D0DCBF578CB}" type="datetimeFigureOut">
               <a:rPr lang="en-US" smtClean="0"/>
-              <a:t>1/28/2018</a:t>
+              <a:t>2/4/2018</a:t>
             </a:fld>
             <a:endParaRPr lang="en-US"/>
           </a:p>
@@ -11135,7 +11135,7 @@
           <a:p>
             <a:fld id="{96FB5D56-0812-4ED5-8B52-3D0DCBF578CB}" type="datetimeFigureOut">
               <a:rPr lang="en-US" smtClean="0"/>
-              <a:t>1/28/2018</a:t>
+              <a:t>2/4/2018</a:t>
             </a:fld>
             <a:endParaRPr lang="en-US"/>
           </a:p>
@@ -11414,7 +11414,7 @@
           <a:p>
             <a:fld id="{96FB5D56-0812-4ED5-8B52-3D0DCBF578CB}" type="datetimeFigureOut">
               <a:rPr lang="en-US" smtClean="0"/>
-              <a:t>1/28/2018</a:t>
+              <a:t>2/4/2018</a:t>
             </a:fld>
             <a:endParaRPr lang="en-US"/>
           </a:p>
@@ -11689,7 +11689,7 @@
           <a:p>
             <a:fld id="{96FB5D56-0812-4ED5-8B52-3D0DCBF578CB}" type="datetimeFigureOut">
               <a:rPr lang="en-US" smtClean="0"/>
-              <a:t>1/28/2018</a:t>
+              <a:t>2/4/2018</a:t>
             </a:fld>
             <a:endParaRPr lang="en-US"/>
           </a:p>
@@ -12118,7 +12118,7 @@
           <a:p>
             <a:fld id="{96FB5D56-0812-4ED5-8B52-3D0DCBF578CB}" type="datetimeFigureOut">
               <a:rPr lang="en-US" smtClean="0"/>
-              <a:t>1/28/2018</a:t>
+              <a:t>2/4/2018</a:t>
             </a:fld>
             <a:endParaRPr lang="en-US"/>
           </a:p>
@@ -14310,8 +14310,20 @@
               <a:buNone/>
             </a:pPr>
             <a:r>
+              <a:rPr lang="en-US" sz="2400" dirty="0"/>
+              <a:t>b</a:t>
+            </a:r>
+            <a:r>
               <a:rPr lang="en-US" sz="2400" dirty="0" smtClean="0"/>
-              <a:t>Bool myVariable2 = false</a:t>
+              <a:t>ool </a:t>
+            </a:r>
+            <a:r>
+              <a:rPr lang="en-US" sz="2400" dirty="0" smtClean="0"/>
+              <a:t>myVariable2 = </a:t>
+            </a:r>
+            <a:r>
+              <a:rPr lang="en-US" sz="2400" dirty="0" smtClean="0"/>
+              <a:t>false;</a:t>
             </a:r>
             <a:endParaRPr lang="en-US" sz="2400" dirty="0"/>
           </a:p>
@@ -15959,7 +15971,7 @@
             </a:pPr>
             <a:r>
               <a:rPr lang="en-US" sz="2600" dirty="0" err="1" smtClean="0"/>
-              <a:t>myArray.Count</a:t>
+              <a:t>myArray.Length</a:t>
             </a:r>
             <a:endParaRPr lang="en-US" sz="2600" dirty="0"/>
           </a:p>
@@ -16124,12 +16136,13 @@
             </a:r>
             <a:r>
               <a:rPr lang="en-US" sz="2800" dirty="0" err="1" smtClean="0"/>
-              <a:t>myArray.Count</a:t>
+              <a:t>myArray.Length</a:t>
             </a:r>
             <a:r>
               <a:rPr lang="en-US" sz="2800" dirty="0" smtClean="0"/>
               <a:t>)</a:t>
             </a:r>
+            <a:endParaRPr lang="en-US" sz="2800" dirty="0" smtClean="0"/>
           </a:p>
           <a:p>
             <a:pPr marL="45720" indent="0">
@@ -16561,7 +16574,7 @@
             </a:r>
             <a:r>
               <a:rPr lang="en-US" sz="2800" dirty="0" err="1" smtClean="0"/>
-              <a:t>myArray.Count</a:t>
+              <a:t>myArray.Length</a:t>
             </a:r>
             <a:r>
               <a:rPr lang="en-US" sz="2800" dirty="0" smtClean="0"/>
@@ -16727,11 +16740,15 @@
             </a:r>
             <a:r>
               <a:rPr lang="en-US" sz="2800" dirty="0" err="1" smtClean="0"/>
-              <a:t>myArray.Count</a:t>
+              <a:t>myArray.Length</a:t>
             </a:r>
             <a:r>
               <a:rPr lang="en-US" sz="2800" dirty="0" smtClean="0"/>
-              <a:t>; counter++)</a:t>
+              <a:t>; </a:t>
+            </a:r>
+            <a:r>
+              <a:rPr lang="en-US" sz="2800" dirty="0" smtClean="0"/>
+              <a:t>counter++)</a:t>
             </a:r>
           </a:p>
           <a:p>

</xml_diff>